<commit_message>
added tty prompt to last question
</commit_message>
<xml_diff>
--- a/T1A3 presentation.pptx
+++ b/T1A3 presentation.pptx
@@ -3618,15 +3618,7 @@
             </a:pPr>
             <a:r>
               <a:rPr lang="en-US" sz="2400" dirty="0"/>
-              <a:t>Asks user for name input, uses </a:t>
-            </a:r>
-            <a:r>
-              <a:rPr lang="en-US" sz="2400"/>
-              <a:t>it throughout </a:t>
-            </a:r>
-            <a:r>
-              <a:rPr lang="en-US" sz="2400" dirty="0"/>
-              <a:t>quiz.</a:t>
+              <a:t>Asks user for name input, uses it throughout quiz.</a:t>
             </a:r>
           </a:p>
           <a:p>
@@ -4331,7 +4323,7 @@
         <p:spPr>
           <a:xfrm>
             <a:off x="857504" y="4648200"/>
-            <a:ext cx="4298696" cy="830997"/>
+            <a:ext cx="4298696" cy="1200329"/>
           </a:xfrm>
           <a:prstGeom prst="rect">
             <a:avLst/>
@@ -4354,7 +4346,7 @@
             </a:r>
             <a:r>
               <a:rPr lang="en-US" sz="2400" dirty="0"/>
-              <a:t> and bold used to improve user experience</a:t>
+              <a:t>, bold and italic are used to improve user experience</a:t>
             </a:r>
           </a:p>
         </p:txBody>
@@ -4374,7 +4366,7 @@
         <p:spPr>
           <a:xfrm>
             <a:off x="6432298" y="4648199"/>
-            <a:ext cx="4298696" cy="830997"/>
+            <a:ext cx="4298696" cy="1200329"/>
           </a:xfrm>
           <a:prstGeom prst="rect">
             <a:avLst/>
@@ -4393,8 +4385,13 @@
             </a:pPr>
             <a:r>
               <a:rPr lang="en-US" sz="2400" dirty="0"/>
-              <a:t>Users can choose Yes or No at end to gamble question</a:t>
-            </a:r>
+              <a:t>Users can choose Yes or No at end to gamble their points on </a:t>
+            </a:r>
+            <a:r>
+              <a:rPr lang="en-US" sz="2400"/>
+              <a:t>last question</a:t>
+            </a:r>
+            <a:endParaRPr lang="en-US" sz="2400" dirty="0"/>
           </a:p>
         </p:txBody>
       </p:sp>

</xml_diff>

<commit_message>
minor fixes to questions
</commit_message>
<xml_diff>
--- a/T1A3 presentation.pptx
+++ b/T1A3 presentation.pptx
@@ -3483,8 +3483,8 @@
         </p:blipFill>
         <p:spPr bwMode="auto">
           <a:xfrm>
-            <a:off x="492577" y="535213"/>
-            <a:ext cx="10204451" cy="5741041"/>
+            <a:off x="492578" y="1449778"/>
+            <a:ext cx="8578852" cy="4826476"/>
           </a:xfrm>
           <a:prstGeom prst="rect">
             <a:avLst/>
@@ -3501,6 +3501,42 @@
           </a:extLst>
         </p:spPr>
       </p:pic>
+      <p:sp>
+        <p:nvSpPr>
+          <p:cNvPr id="6" name="TextBox 5">
+            <a:extLst>
+              <a:ext uri="{FF2B5EF4-FFF2-40B4-BE49-F238E27FC236}">
+                <a16:creationId xmlns:a16="http://schemas.microsoft.com/office/drawing/2014/main" id="{DFD64BB8-1B1C-DB40-8B86-F47B73069023}"/>
+              </a:ext>
+            </a:extLst>
+          </p:cNvPr>
+          <p:cNvSpPr txBox="1"/>
+          <p:nvPr/>
+        </p:nvSpPr>
+        <p:spPr>
+          <a:xfrm>
+            <a:off x="768604" y="452120"/>
+            <a:ext cx="3933128" cy="769441"/>
+          </a:xfrm>
+          <a:prstGeom prst="rect">
+            <a:avLst/>
+          </a:prstGeom>
+          <a:noFill/>
+        </p:spPr>
+        <p:txBody>
+          <a:bodyPr wrap="none" rtlCol="0">
+            <a:spAutoFit/>
+          </a:bodyPr>
+          <a:lstStyle/>
+          <a:p>
+            <a:r>
+              <a:rPr lang="en-US" sz="4400"/>
+              <a:t>Dragon energy…</a:t>
+            </a:r>
+            <a:endParaRPr lang="en-US" sz="4400" dirty="0"/>
+          </a:p>
+        </p:txBody>
+      </p:sp>
     </p:spTree>
     <p:extLst>
       <p:ext uri="{BB962C8B-B14F-4D97-AF65-F5344CB8AC3E}">
@@ -3949,10 +3985,10 @@
       </p:sp>
       <p:sp>
         <p:nvSpPr>
-          <p:cNvPr id="4" name="TextBox 3">
-            <a:extLst>
-              <a:ext uri="{FF2B5EF4-FFF2-40B4-BE49-F238E27FC236}">
-                <a16:creationId xmlns:a16="http://schemas.microsoft.com/office/drawing/2014/main" id="{679DC0B9-A1A7-9849-AFCC-F67E6C088B7E}"/>
+          <p:cNvPr id="5" name="TextBox 4">
+            <a:extLst>
+              <a:ext uri="{FF2B5EF4-FFF2-40B4-BE49-F238E27FC236}">
+                <a16:creationId xmlns:a16="http://schemas.microsoft.com/office/drawing/2014/main" id="{F5A2A115-08F6-4C4D-8C52-21507EE3ECB2}"/>
               </a:ext>
             </a:extLst>
           </p:cNvPr>
@@ -3961,8 +3997,8 @@
         </p:nvSpPr>
         <p:spPr>
           <a:xfrm>
-            <a:off x="950976" y="6035040"/>
-            <a:ext cx="3340017" cy="369332"/>
+            <a:off x="9380909" y="1720840"/>
+            <a:ext cx="1443881" cy="3416320"/>
           </a:xfrm>
           <a:prstGeom prst="rect">
             <a:avLst/>
@@ -3970,13 +4006,13 @@
           <a:noFill/>
         </p:spPr>
         <p:txBody>
-          <a:bodyPr wrap="none" rtlCol="0">
+          <a:bodyPr wrap="square" rtlCol="0">
             <a:spAutoFit/>
           </a:bodyPr>
           <a:lstStyle/>
           <a:p>
             <a:r>
-              <a:rPr lang="en-US" dirty="0">
+              <a:rPr lang="en-US" sz="3600" dirty="0">
                 <a:solidFill>
                   <a:srgbClr val="FF0000"/>
                 </a:solidFill>
@@ -4059,51 +4095,12 @@
           </a:p>
         </p:txBody>
       </p:sp>
-      <p:sp>
-        <p:nvSpPr>
-          <p:cNvPr id="4" name="TextBox 3">
-            <a:extLst>
-              <a:ext uri="{FF2B5EF4-FFF2-40B4-BE49-F238E27FC236}">
-                <a16:creationId xmlns:a16="http://schemas.microsoft.com/office/drawing/2014/main" id="{679DC0B9-A1A7-9849-AFCC-F67E6C088B7E}"/>
-              </a:ext>
-            </a:extLst>
-          </p:cNvPr>
-          <p:cNvSpPr txBox="1"/>
-          <p:nvPr/>
-        </p:nvSpPr>
-        <p:spPr>
-          <a:xfrm>
-            <a:off x="10353366" y="375920"/>
-            <a:ext cx="1443881" cy="923330"/>
-          </a:xfrm>
-          <a:prstGeom prst="rect">
-            <a:avLst/>
-          </a:prstGeom>
-          <a:noFill/>
-        </p:spPr>
-        <p:txBody>
-          <a:bodyPr wrap="square" rtlCol="0">
-            <a:spAutoFit/>
-          </a:bodyPr>
-          <a:lstStyle/>
-          <a:p>
-            <a:r>
-              <a:rPr lang="en-US" dirty="0">
-                <a:solidFill>
-                  <a:srgbClr val="FF0000"/>
-                </a:solidFill>
-              </a:rPr>
-              <a:t>Add more details here from video</a:t>
-            </a:r>
-          </a:p>
-        </p:txBody>
-      </p:sp>
       <p:pic>
         <p:nvPicPr>
-          <p:cNvPr id="6" name="Picture 5">
-            <a:extLst>
-              <a:ext uri="{FF2B5EF4-FFF2-40B4-BE49-F238E27FC236}">
-                <a16:creationId xmlns:a16="http://schemas.microsoft.com/office/drawing/2014/main" id="{C2782B39-9286-AB4B-8BF6-38411F16EDEE}"/>
+          <p:cNvPr id="7" name="Picture 6">
+            <a:extLst>
+              <a:ext uri="{FF2B5EF4-FFF2-40B4-BE49-F238E27FC236}">
+                <a16:creationId xmlns:a16="http://schemas.microsoft.com/office/drawing/2014/main" id="{156A7D21-93D6-7945-9D30-B46E573E4490}"/>
               </a:ext>
             </a:extLst>
           </p:cNvPr>
@@ -4120,8 +4117,8 @@
         </p:blipFill>
         <p:spPr>
           <a:xfrm>
-            <a:off x="857504" y="1403157"/>
-            <a:ext cx="7880096" cy="5028123"/>
+            <a:off x="857504" y="1196162"/>
+            <a:ext cx="6864096" cy="5342390"/>
           </a:xfrm>
           <a:prstGeom prst="rect">
             <a:avLst/>
@@ -4606,13 +4603,8 @@
             </a:pPr>
             <a:r>
               <a:rPr lang="en-US" sz="2400" dirty="0"/>
-              <a:t>Increased visibility for instructions</a:t>
-            </a:r>
-            <a:r>
-              <a:rPr lang="en-US" sz="2400"/>
-              <a:t>, improving UX</a:t>
-            </a:r>
-            <a:endParaRPr lang="en-US" sz="2400" dirty="0"/>
+              <a:t>Increased visibility for instructions, improving UX</a:t>
+            </a:r>
           </a:p>
         </p:txBody>
       </p:sp>
@@ -4756,7 +4748,7 @@
         <p:spPr>
           <a:xfrm>
             <a:off x="857504" y="1353456"/>
-            <a:ext cx="10928096" cy="4278094"/>
+            <a:ext cx="10928096" cy="3970318"/>
           </a:xfrm>
           <a:prstGeom prst="rect">
             <a:avLst/>
@@ -4841,16 +4833,6 @@
             <a:r>
               <a:rPr lang="en-US" sz="2000" dirty="0"/>
               <a:t>Store user scores</a:t>
-            </a:r>
-          </a:p>
-          <a:p>
-            <a:pPr marL="800100" lvl="1" indent="-342900">
-              <a:buFontTx/>
-              <a:buChar char="-"/>
-            </a:pPr>
-            <a:r>
-              <a:rPr lang="en-US" sz="2000" dirty="0"/>
-              <a:t>Remove duplication in gamble question code</a:t>
             </a:r>
           </a:p>
           <a:p>

</xml_diff>